<commit_message>
Correcting some typos here and there.
</commit_message>
<xml_diff>
--- a/W12/1. W12S1 final/W12S1.pptx
+++ b/W12/1. W12S1 final/W12S1.pptx
@@ -277,7 +277,7 @@
   <pc:docChgLst>
     <pc:chgData name="Matthieu De Mari" userId="dfb708c9-d8dc-439f-9a3b-c772bf4a311c" providerId="ADAL" clId="{C9891248-3CF4-4447-96F0-9BE6AA5FCBC0}"/>
     <pc:docChg chg="undo redo custSel addSld delSld modSld sldOrd addSection delSection modSection">
-      <pc:chgData name="Matthieu De Mari" userId="dfb708c9-d8dc-439f-9a3b-c772bf4a311c" providerId="ADAL" clId="{C9891248-3CF4-4447-96F0-9BE6AA5FCBC0}" dt="2023-10-05T06:28:59.115" v="12624" actId="114"/>
+      <pc:chgData name="Matthieu De Mari" userId="dfb708c9-d8dc-439f-9a3b-c772bf4a311c" providerId="ADAL" clId="{C9891248-3CF4-4447-96F0-9BE6AA5FCBC0}" dt="2024-02-09T01:14:38.323" v="12698" actId="20577"/>
       <pc:docMkLst>
         <pc:docMk/>
       </pc:docMkLst>
@@ -420,7 +420,7 @@
         </pc:picChg>
       </pc:sldChg>
       <pc:sldChg chg="addSp delSp modSp new mod modClrScheme chgLayout">
-        <pc:chgData name="Matthieu De Mari" userId="dfb708c9-d8dc-439f-9a3b-c772bf4a311c" providerId="ADAL" clId="{C9891248-3CF4-4447-96F0-9BE6AA5FCBC0}" dt="2023-10-05T04:02:58.986" v="3100" actId="14100"/>
+        <pc:chgData name="Matthieu De Mari" userId="dfb708c9-d8dc-439f-9a3b-c772bf4a311c" providerId="ADAL" clId="{C9891248-3CF4-4447-96F0-9BE6AA5FCBC0}" dt="2024-02-09T01:11:25.483" v="12663" actId="20577"/>
         <pc:sldMkLst>
           <pc:docMk/>
           <pc:sldMk cId="2542347167" sldId="537"/>
@@ -434,7 +434,7 @@
           </ac:spMkLst>
         </pc:spChg>
         <pc:spChg chg="mod ord">
-          <ac:chgData name="Matthieu De Mari" userId="dfb708c9-d8dc-439f-9a3b-c772bf4a311c" providerId="ADAL" clId="{C9891248-3CF4-4447-96F0-9BE6AA5FCBC0}" dt="2023-10-05T04:02:38.340" v="3095" actId="20577"/>
+          <ac:chgData name="Matthieu De Mari" userId="dfb708c9-d8dc-439f-9a3b-c772bf4a311c" providerId="ADAL" clId="{C9891248-3CF4-4447-96F0-9BE6AA5FCBC0}" dt="2024-02-09T01:11:25.483" v="12663" actId="20577"/>
           <ac:spMkLst>
             <pc:docMk/>
             <pc:sldMk cId="2542347167" sldId="537"/>
@@ -599,7 +599,7 @@
         </pc:spChg>
       </pc:sldChg>
       <pc:sldChg chg="modSp new mod">
-        <pc:chgData name="Matthieu De Mari" userId="dfb708c9-d8dc-439f-9a3b-c772bf4a311c" providerId="ADAL" clId="{C9891248-3CF4-4447-96F0-9BE6AA5FCBC0}" dt="2023-10-05T06:08:16.222" v="11234" actId="20577"/>
+        <pc:chgData name="Matthieu De Mari" userId="dfb708c9-d8dc-439f-9a3b-c772bf4a311c" providerId="ADAL" clId="{C9891248-3CF4-4447-96F0-9BE6AA5FCBC0}" dt="2024-02-09T01:13:46.116" v="12672" actId="20577"/>
         <pc:sldMkLst>
           <pc:docMk/>
           <pc:sldMk cId="50560222" sldId="542"/>
@@ -613,7 +613,7 @@
           </ac:spMkLst>
         </pc:spChg>
         <pc:spChg chg="mod">
-          <ac:chgData name="Matthieu De Mari" userId="dfb708c9-d8dc-439f-9a3b-c772bf4a311c" providerId="ADAL" clId="{C9891248-3CF4-4447-96F0-9BE6AA5FCBC0}" dt="2023-10-05T06:08:16.222" v="11234" actId="20577"/>
+          <ac:chgData name="Matthieu De Mari" userId="dfb708c9-d8dc-439f-9a3b-c772bf4a311c" providerId="ADAL" clId="{C9891248-3CF4-4447-96F0-9BE6AA5FCBC0}" dt="2024-02-09T01:13:46.116" v="12672" actId="20577"/>
           <ac:spMkLst>
             <pc:docMk/>
             <pc:sldMk cId="50560222" sldId="542"/>
@@ -622,7 +622,7 @@
         </pc:spChg>
       </pc:sldChg>
       <pc:sldChg chg="addSp delSp modSp new mod modClrScheme chgLayout">
-        <pc:chgData name="Matthieu De Mari" userId="dfb708c9-d8dc-439f-9a3b-c772bf4a311c" providerId="ADAL" clId="{C9891248-3CF4-4447-96F0-9BE6AA5FCBC0}" dt="2023-10-05T06:14:43.351" v="11812" actId="20577"/>
+        <pc:chgData name="Matthieu De Mari" userId="dfb708c9-d8dc-439f-9a3b-c772bf4a311c" providerId="ADAL" clId="{C9891248-3CF4-4447-96F0-9BE6AA5FCBC0}" dt="2024-02-09T01:14:28.360" v="12690" actId="20577"/>
         <pc:sldMkLst>
           <pc:docMk/>
           <pc:sldMk cId="3527338206" sldId="543"/>
@@ -652,7 +652,7 @@
           </ac:spMkLst>
         </pc:spChg>
         <pc:spChg chg="add mod ord">
-          <ac:chgData name="Matthieu De Mari" userId="dfb708c9-d8dc-439f-9a3b-c772bf4a311c" providerId="ADAL" clId="{C9891248-3CF4-4447-96F0-9BE6AA5FCBC0}" dt="2023-10-05T06:14:43.351" v="11812" actId="20577"/>
+          <ac:chgData name="Matthieu De Mari" userId="dfb708c9-d8dc-439f-9a3b-c772bf4a311c" providerId="ADAL" clId="{C9891248-3CF4-4447-96F0-9BE6AA5FCBC0}" dt="2024-02-09T01:14:28.360" v="12690" actId="20577"/>
           <ac:spMkLst>
             <pc:docMk/>
             <pc:sldMk cId="3527338206" sldId="543"/>
@@ -872,13 +872,13 @@
         </pc:picChg>
       </pc:sldChg>
       <pc:sldChg chg="addSp delSp modSp new mod modClrScheme chgLayout">
-        <pc:chgData name="Matthieu De Mari" userId="dfb708c9-d8dc-439f-9a3b-c772bf4a311c" providerId="ADAL" clId="{C9891248-3CF4-4447-96F0-9BE6AA5FCBC0}" dt="2023-10-05T03:57:11.319" v="2832" actId="20577"/>
+        <pc:chgData name="Matthieu De Mari" userId="dfb708c9-d8dc-439f-9a3b-c772bf4a311c" providerId="ADAL" clId="{C9891248-3CF4-4447-96F0-9BE6AA5FCBC0}" dt="2024-02-09T01:11:08.719" v="12645" actId="20577"/>
         <pc:sldMkLst>
           <pc:docMk/>
           <pc:sldMk cId="1781579465" sldId="549"/>
         </pc:sldMkLst>
         <pc:spChg chg="mod ord">
-          <ac:chgData name="Matthieu De Mari" userId="dfb708c9-d8dc-439f-9a3b-c772bf4a311c" providerId="ADAL" clId="{C9891248-3CF4-4447-96F0-9BE6AA5FCBC0}" dt="2023-10-05T03:52:00.289" v="2528" actId="700"/>
+          <ac:chgData name="Matthieu De Mari" userId="dfb708c9-d8dc-439f-9a3b-c772bf4a311c" providerId="ADAL" clId="{C9891248-3CF4-4447-96F0-9BE6AA5FCBC0}" dt="2024-02-09T01:11:08.719" v="12645" actId="20577"/>
           <ac:spMkLst>
             <pc:docMk/>
             <pc:sldMk cId="1781579465" sldId="549"/>
@@ -1891,7 +1891,7 @@
         </pc:picChg>
       </pc:sldChg>
       <pc:sldChg chg="addSp delSp modSp add mod modClrScheme chgLayout">
-        <pc:chgData name="Matthieu De Mari" userId="dfb708c9-d8dc-439f-9a3b-c772bf4a311c" providerId="ADAL" clId="{C9891248-3CF4-4447-96F0-9BE6AA5FCBC0}" dt="2023-10-05T06:17:33.725" v="11969" actId="1076"/>
+        <pc:chgData name="Matthieu De Mari" userId="dfb708c9-d8dc-439f-9a3b-c772bf4a311c" providerId="ADAL" clId="{C9891248-3CF4-4447-96F0-9BE6AA5FCBC0}" dt="2024-02-09T01:14:38.323" v="12698" actId="20577"/>
         <pc:sldMkLst>
           <pc:docMk/>
           <pc:sldMk cId="586362090" sldId="577"/>
@@ -1905,7 +1905,7 @@
           </ac:spMkLst>
         </pc:spChg>
         <pc:spChg chg="mod ord">
-          <ac:chgData name="Matthieu De Mari" userId="dfb708c9-d8dc-439f-9a3b-c772bf4a311c" providerId="ADAL" clId="{C9891248-3CF4-4447-96F0-9BE6AA5FCBC0}" dt="2023-10-05T06:17:27.570" v="11966" actId="700"/>
+          <ac:chgData name="Matthieu De Mari" userId="dfb708c9-d8dc-439f-9a3b-c772bf4a311c" providerId="ADAL" clId="{C9891248-3CF4-4447-96F0-9BE6AA5FCBC0}" dt="2024-02-09T01:14:38.323" v="12698" actId="20577"/>
           <ac:spMkLst>
             <pc:docMk/>
             <pc:sldMk cId="586362090" sldId="577"/>
@@ -5207,7 +5207,7 @@
           <a:p>
             <a:fld id="{61478373-EB31-4867-8CF0-FA31364748A5}" type="datetimeFigureOut">
               <a:rPr lang="en-GB" smtClean="0"/>
-              <a:t>05/10/2023</a:t>
+              <a:t>09/02/2024</a:t>
             </a:fld>
             <a:endParaRPr lang="en-GB"/>
           </a:p>
@@ -5624,7 +5624,7 @@
           <a:p>
             <a:fld id="{E85DF616-B21E-4EF6-A6A5-95E2FB3EB1A1}" type="datetimeFigureOut">
               <a:rPr lang="en-GB" smtClean="0"/>
-              <a:t>05/10/2023</a:t>
+              <a:t>09/02/2024</a:t>
             </a:fld>
             <a:endParaRPr lang="en-GB"/>
           </a:p>
@@ -5824,7 +5824,7 @@
           <a:p>
             <a:fld id="{E85DF616-B21E-4EF6-A6A5-95E2FB3EB1A1}" type="datetimeFigureOut">
               <a:rPr lang="en-GB" smtClean="0"/>
-              <a:t>05/10/2023</a:t>
+              <a:t>09/02/2024</a:t>
             </a:fld>
             <a:endParaRPr lang="en-GB"/>
           </a:p>
@@ -6034,7 +6034,7 @@
           <a:p>
             <a:fld id="{E85DF616-B21E-4EF6-A6A5-95E2FB3EB1A1}" type="datetimeFigureOut">
               <a:rPr lang="en-GB" smtClean="0"/>
-              <a:t>05/10/2023</a:t>
+              <a:t>09/02/2024</a:t>
             </a:fld>
             <a:endParaRPr lang="en-GB"/>
           </a:p>
@@ -6234,7 +6234,7 @@
           <a:p>
             <a:fld id="{E85DF616-B21E-4EF6-A6A5-95E2FB3EB1A1}" type="datetimeFigureOut">
               <a:rPr lang="en-GB" smtClean="0"/>
-              <a:t>05/10/2023</a:t>
+              <a:t>09/02/2024</a:t>
             </a:fld>
             <a:endParaRPr lang="en-GB"/>
           </a:p>
@@ -6510,7 +6510,7 @@
           <a:p>
             <a:fld id="{E85DF616-B21E-4EF6-A6A5-95E2FB3EB1A1}" type="datetimeFigureOut">
               <a:rPr lang="en-GB" smtClean="0"/>
-              <a:t>05/10/2023</a:t>
+              <a:t>09/02/2024</a:t>
             </a:fld>
             <a:endParaRPr lang="en-GB"/>
           </a:p>
@@ -6778,7 +6778,7 @@
           <a:p>
             <a:fld id="{E85DF616-B21E-4EF6-A6A5-95E2FB3EB1A1}" type="datetimeFigureOut">
               <a:rPr lang="en-GB" smtClean="0"/>
-              <a:t>05/10/2023</a:t>
+              <a:t>09/02/2024</a:t>
             </a:fld>
             <a:endParaRPr lang="en-GB"/>
           </a:p>
@@ -7193,7 +7193,7 @@
           <a:p>
             <a:fld id="{E85DF616-B21E-4EF6-A6A5-95E2FB3EB1A1}" type="datetimeFigureOut">
               <a:rPr lang="en-GB" smtClean="0"/>
-              <a:t>05/10/2023</a:t>
+              <a:t>09/02/2024</a:t>
             </a:fld>
             <a:endParaRPr lang="en-GB"/>
           </a:p>
@@ -7335,7 +7335,7 @@
           <a:p>
             <a:fld id="{E85DF616-B21E-4EF6-A6A5-95E2FB3EB1A1}" type="datetimeFigureOut">
               <a:rPr lang="en-GB" smtClean="0"/>
-              <a:t>05/10/2023</a:t>
+              <a:t>09/02/2024</a:t>
             </a:fld>
             <a:endParaRPr lang="en-GB"/>
           </a:p>
@@ -7448,7 +7448,7 @@
           <a:p>
             <a:fld id="{E85DF616-B21E-4EF6-A6A5-95E2FB3EB1A1}" type="datetimeFigureOut">
               <a:rPr lang="en-GB" smtClean="0"/>
-              <a:t>05/10/2023</a:t>
+              <a:t>09/02/2024</a:t>
             </a:fld>
             <a:endParaRPr lang="en-GB"/>
           </a:p>
@@ -7761,7 +7761,7 @@
           <a:p>
             <a:fld id="{E85DF616-B21E-4EF6-A6A5-95E2FB3EB1A1}" type="datetimeFigureOut">
               <a:rPr lang="en-GB" smtClean="0"/>
-              <a:t>05/10/2023</a:t>
+              <a:t>09/02/2024</a:t>
             </a:fld>
             <a:endParaRPr lang="en-GB"/>
           </a:p>
@@ -8050,7 +8050,7 @@
           <a:p>
             <a:fld id="{E85DF616-B21E-4EF6-A6A5-95E2FB3EB1A1}" type="datetimeFigureOut">
               <a:rPr lang="en-GB" smtClean="0"/>
-              <a:t>05/10/2023</a:t>
+              <a:t>09/02/2024</a:t>
             </a:fld>
             <a:endParaRPr lang="en-GB"/>
           </a:p>
@@ -8293,7 +8293,7 @@
           <a:p>
             <a:fld id="{E85DF616-B21E-4EF6-A6A5-95E2FB3EB1A1}" type="datetimeFigureOut">
               <a:rPr lang="en-GB" smtClean="0"/>
-              <a:t>05/10/2023</a:t>
+              <a:t>09/02/2024</a:t>
             </a:fld>
             <a:endParaRPr lang="en-GB"/>
           </a:p>
@@ -18482,8 +18482,8 @@
           </a:p>
         </p:txBody>
       </p:sp>
-      <mc:AlternateContent xmlns:mc="http://schemas.openxmlformats.org/markup-compatibility/2006" xmlns:a14="http://schemas.microsoft.com/office/drawing/2010/main">
-        <mc:Choice Requires="a14">
+      <mc:AlternateContent xmlns:mc="http://schemas.openxmlformats.org/markup-compatibility/2006">
+        <mc:Choice xmlns:a14="http://schemas.microsoft.com/office/drawing/2010/main" Requires="a14">
           <p:sp>
             <p:nvSpPr>
               <p:cNvPr id="3" name="Content Placeholder 2">
@@ -18523,7 +18523,7 @@
               <a:p>
                 <a:r>
                   <a:rPr lang="en-GB" dirty="0"/>
-                  <a:t>If you suspect that the analytical has a certain </a:t>
+                  <a:t>If you suspect that the analytical solution has a certain </a:t>
                 </a:r>
                 <a:r>
                   <a:rPr lang="en-GB" dirty="0" err="1"/>
@@ -18618,7 +18618,7 @@
             </p:txBody>
           </p:sp>
         </mc:Choice>
-        <mc:Fallback xmlns="">
+        <mc:Fallback>
           <p:sp>
             <p:nvSpPr>
               <p:cNvPr id="3" name="Content Placeholder 2">
@@ -19640,16 +19640,38 @@
           <a:p>
             <a:r>
               <a:rPr lang="en-GB" dirty="0"/>
-              <a:t>Taking into account different types of boundary/initial conditions.</a:t>
+              <a:t>Taking into account </a:t>
+            </a:r>
+            <a:r>
+              <a:rPr lang="en-GB" b="1" dirty="0"/>
+              <a:t>different types of boundary/initial conditions</a:t>
+            </a:r>
+            <a:r>
+              <a:rPr lang="en-GB" dirty="0"/>
+              <a:t>.</a:t>
             </a:r>
           </a:p>
           <a:p>
             <a:pPr marL="0" indent="0">
               <a:buNone/>
             </a:pPr>
+            <a:endParaRPr lang="en-GB" dirty="0"/>
+          </a:p>
+          <a:p>
+            <a:pPr marL="0" indent="0">
+              <a:buNone/>
+            </a:pPr>
             <a:r>
               <a:rPr lang="en-GB" dirty="0"/>
-              <a:t>(Some of them might require to use the grad function to calculate but we know how to do that!)</a:t>
+              <a:t>(Some of them might require to use the </a:t>
+            </a:r>
+            <a:r>
+              <a:rPr lang="en-GB" dirty="0" err="1"/>
+              <a:t>autograd</a:t>
+            </a:r>
+            <a:r>
+              <a:rPr lang="en-GB" dirty="0"/>
+              <a:t> function to calculate derivatives but we know how to do that!)</a:t>
             </a:r>
           </a:p>
         </p:txBody>
@@ -19782,7 +19804,7 @@
           <a:p>
             <a:r>
               <a:rPr lang="en-GB" dirty="0"/>
-              <a:t>Higher order and/or mixed derivatives.</a:t>
+              <a:t>Using higher order and/or mixed derivatives.</a:t>
             </a:r>
           </a:p>
           <a:p>
@@ -21216,7 +21238,7 @@
           <a:p>
             <a:r>
               <a:rPr lang="en-GB" dirty="0"/>
-              <a:t>Why is Navier-Stokes a Millenium Prize Problem anyway?</a:t>
+              <a:t>Quick parenthesis: Why is Navier-Stokes a Millenium Prize Problem anyway?</a:t>
             </a:r>
           </a:p>
         </p:txBody>
@@ -21380,7 +21402,7 @@
             </a:pPr>
             <a:r>
               <a:rPr lang="en-GB" b="1" dirty="0"/>
-              <a:t>Definition (The finite element method):</a:t>
+              <a:t>Definition (The finite element method – out-of-scope):</a:t>
             </a:r>
           </a:p>
           <a:p>

</xml_diff>

<commit_message>
Minor changes after teaching W6. Preparing to split W6S and W6S3 again.
</commit_message>
<xml_diff>
--- a/W12/1. W12S1 final/W12S1.pptx
+++ b/W12/1. W12S1 final/W12S1.pptx
@@ -267,7 +267,7 @@
 <file path=ppt/revisionInfo.xml><?xml version="1.0" encoding="utf-8"?>
 <p1510:revInfo xmlns:a="http://schemas.openxmlformats.org/drawingml/2006/main" xmlns:r="http://schemas.openxmlformats.org/officeDocument/2006/relationships" xmlns:p1510="http://schemas.microsoft.com/office/powerpoint/2015/10/main">
   <p1510:revLst>
-    <p1510:client id="{C9891248-3CF4-4447-96F0-9BE6AA5FCBC0}" v="2070" dt="2023-10-05T06:26:21.468"/>
+    <p1510:client id="{C9891248-3CF4-4447-96F0-9BE6AA5FCBC0}" v="2072" dt="2024-02-28T07:49:09.925"/>
   </p1510:revLst>
 </p1510:revInfo>
 </file>
@@ -277,7 +277,7 @@
   <pc:docChgLst>
     <pc:chgData name="Matthieu De Mari" userId="dfb708c9-d8dc-439f-9a3b-c772bf4a311c" providerId="ADAL" clId="{C9891248-3CF4-4447-96F0-9BE6AA5FCBC0}"/>
     <pc:docChg chg="undo redo custSel addSld delSld modSld sldOrd addSection delSection modSection">
-      <pc:chgData name="Matthieu De Mari" userId="dfb708c9-d8dc-439f-9a3b-c772bf4a311c" providerId="ADAL" clId="{C9891248-3CF4-4447-96F0-9BE6AA5FCBC0}" dt="2024-02-09T01:14:38.323" v="12698" actId="20577"/>
+      <pc:chgData name="Matthieu De Mari" userId="dfb708c9-d8dc-439f-9a3b-c772bf4a311c" providerId="ADAL" clId="{C9891248-3CF4-4447-96F0-9BE6AA5FCBC0}" dt="2024-02-28T07:49:17.822" v="12793" actId="20577"/>
       <pc:docMkLst>
         <pc:docMk/>
       </pc:docMkLst>
@@ -1961,13 +1961,13 @@
         </pc:picChg>
       </pc:sldChg>
       <pc:sldChg chg="modSp add mod">
-        <pc:chgData name="Matthieu De Mari" userId="dfb708c9-d8dc-439f-9a3b-c772bf4a311c" providerId="ADAL" clId="{C9891248-3CF4-4447-96F0-9BE6AA5FCBC0}" dt="2023-10-05T06:26:55.550" v="12620" actId="20577"/>
+        <pc:chgData name="Matthieu De Mari" userId="dfb708c9-d8dc-439f-9a3b-c772bf4a311c" providerId="ADAL" clId="{C9891248-3CF4-4447-96F0-9BE6AA5FCBC0}" dt="2024-02-28T07:49:17.822" v="12793" actId="20577"/>
         <pc:sldMkLst>
           <pc:docMk/>
           <pc:sldMk cId="3168452983" sldId="579"/>
         </pc:sldMkLst>
         <pc:spChg chg="mod">
-          <ac:chgData name="Matthieu De Mari" userId="dfb708c9-d8dc-439f-9a3b-c772bf4a311c" providerId="ADAL" clId="{C9891248-3CF4-4447-96F0-9BE6AA5FCBC0}" dt="2023-10-05T06:26:55.550" v="12620" actId="20577"/>
+          <ac:chgData name="Matthieu De Mari" userId="dfb708c9-d8dc-439f-9a3b-c772bf4a311c" providerId="ADAL" clId="{C9891248-3CF4-4447-96F0-9BE6AA5FCBC0}" dt="2024-02-28T07:49:17.822" v="12793" actId="20577"/>
           <ac:spMkLst>
             <pc:docMk/>
             <pc:sldMk cId="3168452983" sldId="579"/>
@@ -5207,7 +5207,7 @@
           <a:p>
             <a:fld id="{61478373-EB31-4867-8CF0-FA31364748A5}" type="datetimeFigureOut">
               <a:rPr lang="en-GB" smtClean="0"/>
-              <a:t>09/02/2024</a:t>
+              <a:t>28/02/2024</a:t>
             </a:fld>
             <a:endParaRPr lang="en-GB"/>
           </a:p>
@@ -5624,7 +5624,7 @@
           <a:p>
             <a:fld id="{E85DF616-B21E-4EF6-A6A5-95E2FB3EB1A1}" type="datetimeFigureOut">
               <a:rPr lang="en-GB" smtClean="0"/>
-              <a:t>09/02/2024</a:t>
+              <a:t>28/02/2024</a:t>
             </a:fld>
             <a:endParaRPr lang="en-GB"/>
           </a:p>
@@ -5824,7 +5824,7 @@
           <a:p>
             <a:fld id="{E85DF616-B21E-4EF6-A6A5-95E2FB3EB1A1}" type="datetimeFigureOut">
               <a:rPr lang="en-GB" smtClean="0"/>
-              <a:t>09/02/2024</a:t>
+              <a:t>28/02/2024</a:t>
             </a:fld>
             <a:endParaRPr lang="en-GB"/>
           </a:p>
@@ -6034,7 +6034,7 @@
           <a:p>
             <a:fld id="{E85DF616-B21E-4EF6-A6A5-95E2FB3EB1A1}" type="datetimeFigureOut">
               <a:rPr lang="en-GB" smtClean="0"/>
-              <a:t>09/02/2024</a:t>
+              <a:t>28/02/2024</a:t>
             </a:fld>
             <a:endParaRPr lang="en-GB"/>
           </a:p>
@@ -6234,7 +6234,7 @@
           <a:p>
             <a:fld id="{E85DF616-B21E-4EF6-A6A5-95E2FB3EB1A1}" type="datetimeFigureOut">
               <a:rPr lang="en-GB" smtClean="0"/>
-              <a:t>09/02/2024</a:t>
+              <a:t>28/02/2024</a:t>
             </a:fld>
             <a:endParaRPr lang="en-GB"/>
           </a:p>
@@ -6510,7 +6510,7 @@
           <a:p>
             <a:fld id="{E85DF616-B21E-4EF6-A6A5-95E2FB3EB1A1}" type="datetimeFigureOut">
               <a:rPr lang="en-GB" smtClean="0"/>
-              <a:t>09/02/2024</a:t>
+              <a:t>28/02/2024</a:t>
             </a:fld>
             <a:endParaRPr lang="en-GB"/>
           </a:p>
@@ -6778,7 +6778,7 @@
           <a:p>
             <a:fld id="{E85DF616-B21E-4EF6-A6A5-95E2FB3EB1A1}" type="datetimeFigureOut">
               <a:rPr lang="en-GB" smtClean="0"/>
-              <a:t>09/02/2024</a:t>
+              <a:t>28/02/2024</a:t>
             </a:fld>
             <a:endParaRPr lang="en-GB"/>
           </a:p>
@@ -7193,7 +7193,7 @@
           <a:p>
             <a:fld id="{E85DF616-B21E-4EF6-A6A5-95E2FB3EB1A1}" type="datetimeFigureOut">
               <a:rPr lang="en-GB" smtClean="0"/>
-              <a:t>09/02/2024</a:t>
+              <a:t>28/02/2024</a:t>
             </a:fld>
             <a:endParaRPr lang="en-GB"/>
           </a:p>
@@ -7335,7 +7335,7 @@
           <a:p>
             <a:fld id="{E85DF616-B21E-4EF6-A6A5-95E2FB3EB1A1}" type="datetimeFigureOut">
               <a:rPr lang="en-GB" smtClean="0"/>
-              <a:t>09/02/2024</a:t>
+              <a:t>28/02/2024</a:t>
             </a:fld>
             <a:endParaRPr lang="en-GB"/>
           </a:p>
@@ -7448,7 +7448,7 @@
           <a:p>
             <a:fld id="{E85DF616-B21E-4EF6-A6A5-95E2FB3EB1A1}" type="datetimeFigureOut">
               <a:rPr lang="en-GB" smtClean="0"/>
-              <a:t>09/02/2024</a:t>
+              <a:t>28/02/2024</a:t>
             </a:fld>
             <a:endParaRPr lang="en-GB"/>
           </a:p>
@@ -7761,7 +7761,7 @@
           <a:p>
             <a:fld id="{E85DF616-B21E-4EF6-A6A5-95E2FB3EB1A1}" type="datetimeFigureOut">
               <a:rPr lang="en-GB" smtClean="0"/>
-              <a:t>09/02/2024</a:t>
+              <a:t>28/02/2024</a:t>
             </a:fld>
             <a:endParaRPr lang="en-GB"/>
           </a:p>
@@ -8050,7 +8050,7 @@
           <a:p>
             <a:fld id="{E85DF616-B21E-4EF6-A6A5-95E2FB3EB1A1}" type="datetimeFigureOut">
               <a:rPr lang="en-GB" smtClean="0"/>
-              <a:t>09/02/2024</a:t>
+              <a:t>28/02/2024</a:t>
             </a:fld>
             <a:endParaRPr lang="en-GB"/>
           </a:p>
@@ -8293,7 +8293,7 @@
           <a:p>
             <a:fld id="{E85DF616-B21E-4EF6-A6A5-95E2FB3EB1A1}" type="datetimeFigureOut">
               <a:rPr lang="en-GB" smtClean="0"/>
-              <a:t>09/02/2024</a:t>
+              <a:t>28/02/2024</a:t>
             </a:fld>
             <a:endParaRPr lang="en-GB"/>
           </a:p>
@@ -18482,8 +18482,8 @@
           </a:p>
         </p:txBody>
       </p:sp>
-      <mc:AlternateContent xmlns:mc="http://schemas.openxmlformats.org/markup-compatibility/2006">
-        <mc:Choice xmlns:a14="http://schemas.microsoft.com/office/drawing/2010/main" Requires="a14">
+      <mc:AlternateContent xmlns:mc="http://schemas.openxmlformats.org/markup-compatibility/2006" xmlns:a14="http://schemas.microsoft.com/office/drawing/2010/main">
+        <mc:Choice Requires="a14">
           <p:sp>
             <p:nvSpPr>
               <p:cNvPr id="3" name="Content Placeholder 2">
@@ -18618,7 +18618,7 @@
             </p:txBody>
           </p:sp>
         </mc:Choice>
-        <mc:Fallback>
+        <mc:Fallback xmlns="">
           <p:sp>
             <p:nvSpPr>
               <p:cNvPr id="3" name="Content Placeholder 2">
@@ -20569,6 +20569,29 @@
               </a:rPr>
               <a:t>https://benmoseley.blog/my-research/so-what-is-a-physics-informed-neural-network/</a:t>
             </a:r>
+            <a:endParaRPr lang="en-GB" dirty="0"/>
+          </a:p>
+          <a:p>
+            <a:r>
+              <a:rPr lang="en-GB" dirty="0"/>
+              <a:t>Predicting the market by resolving the Black-Scholes-Merton PDE using </a:t>
+            </a:r>
+            <a:r>
+              <a:rPr lang="en-GB"/>
+              <a:t>Machine Learning?</a:t>
+            </a:r>
+            <a:br>
+              <a:rPr lang="en-GB" dirty="0"/>
+            </a:br>
+            <a:r>
+              <a:rPr lang="en-GB" dirty="0">
+                <a:hlinkClick r:id="rId3"/>
+              </a:rPr>
+              <a:t>https://www.youtube.com/watch?v=A5w-dEgIU1M</a:t>
+            </a:r>
+            <a:endParaRPr lang="en-GB" dirty="0"/>
+          </a:p>
+          <a:p>
             <a:endParaRPr lang="en-GB" dirty="0"/>
           </a:p>
           <a:p>

</xml_diff>